<commit_message>
This proj is finished. no more commits.
(I hope so)

Signed-off-by: PeterRong <rongyy@shanghaitech.edu.cn>
</commit_message>
<xml_diff>
--- a/ANC_Pre.pptx
+++ b/ANC_Pre.pptx
@@ -849,7 +849,7 @@
           <a:p>
             <a:fld id="{D8098D11-86FE-477F-B983-03596CFA7F85}" type="datetimeFigureOut">
               <a:rPr lang="en-US" smtClean="0"/>
-              <a:t>6/2/2017</a:t>
+              <a:t>6/3/2017</a:t>
             </a:fld>
             <a:endParaRPr lang="en-US"/>
           </a:p>
@@ -1100,7 +1100,7 @@
           <a:p>
             <a:fld id="{D8098D11-86FE-477F-B983-03596CFA7F85}" type="datetimeFigureOut">
               <a:rPr lang="en-US" smtClean="0"/>
-              <a:t>6/2/2017</a:t>
+              <a:t>6/3/2017</a:t>
             </a:fld>
             <a:endParaRPr lang="en-US"/>
           </a:p>
@@ -1414,7 +1414,7 @@
           <a:p>
             <a:fld id="{D8098D11-86FE-477F-B983-03596CFA7F85}" type="datetimeFigureOut">
               <a:rPr lang="en-US" smtClean="0"/>
-              <a:t>6/2/2017</a:t>
+              <a:t>6/3/2017</a:t>
             </a:fld>
             <a:endParaRPr lang="en-US"/>
           </a:p>
@@ -1741,7 +1741,7 @@
           <a:p>
             <a:fld id="{D8098D11-86FE-477F-B983-03596CFA7F85}" type="datetimeFigureOut">
               <a:rPr lang="en-US" smtClean="0"/>
-              <a:t>6/2/2017</a:t>
+              <a:t>6/3/2017</a:t>
             </a:fld>
             <a:endParaRPr lang="en-US"/>
           </a:p>
@@ -2055,7 +2055,7 @@
           <a:p>
             <a:fld id="{D8098D11-86FE-477F-B983-03596CFA7F85}" type="datetimeFigureOut">
               <a:rPr lang="en-US" smtClean="0"/>
-              <a:t>6/2/2017</a:t>
+              <a:t>6/3/2017</a:t>
             </a:fld>
             <a:endParaRPr lang="en-US"/>
           </a:p>
@@ -2442,7 +2442,7 @@
           <a:p>
             <a:fld id="{D8098D11-86FE-477F-B983-03596CFA7F85}" type="datetimeFigureOut">
               <a:rPr lang="en-US" smtClean="0"/>
-              <a:t>6/2/2017</a:t>
+              <a:t>6/3/2017</a:t>
             </a:fld>
             <a:endParaRPr lang="en-US"/>
           </a:p>
@@ -2612,7 +2612,7 @@
           <a:p>
             <a:fld id="{D8098D11-86FE-477F-B983-03596CFA7F85}" type="datetimeFigureOut">
               <a:rPr lang="en-US" smtClean="0"/>
-              <a:t>6/2/2017</a:t>
+              <a:t>6/3/2017</a:t>
             </a:fld>
             <a:endParaRPr lang="en-US"/>
           </a:p>
@@ -2792,7 +2792,7 @@
           <a:p>
             <a:fld id="{D8098D11-86FE-477F-B983-03596CFA7F85}" type="datetimeFigureOut">
               <a:rPr lang="en-US" smtClean="0"/>
-              <a:t>6/2/2017</a:t>
+              <a:t>6/3/2017</a:t>
             </a:fld>
             <a:endParaRPr lang="en-US"/>
           </a:p>
@@ -2968,7 +2968,7 @@
           <a:p>
             <a:fld id="{D8098D11-86FE-477F-B983-03596CFA7F85}" type="datetimeFigureOut">
               <a:rPr lang="en-US" smtClean="0"/>
-              <a:t>6/2/2017</a:t>
+              <a:t>6/3/2017</a:t>
             </a:fld>
             <a:endParaRPr lang="en-US"/>
           </a:p>
@@ -3215,7 +3215,7 @@
           <a:p>
             <a:fld id="{D8098D11-86FE-477F-B983-03596CFA7F85}" type="datetimeFigureOut">
               <a:rPr lang="en-US" smtClean="0"/>
-              <a:t>6/2/2017</a:t>
+              <a:t>6/3/2017</a:t>
             </a:fld>
             <a:endParaRPr lang="en-US"/>
           </a:p>
@@ -3447,7 +3447,7 @@
           <a:p>
             <a:fld id="{D8098D11-86FE-477F-B983-03596CFA7F85}" type="datetimeFigureOut">
               <a:rPr lang="en-US" smtClean="0"/>
-              <a:t>6/2/2017</a:t>
+              <a:t>6/3/2017</a:t>
             </a:fld>
             <a:endParaRPr lang="en-US"/>
           </a:p>
@@ -3821,7 +3821,7 @@
           <a:p>
             <a:fld id="{D8098D11-86FE-477F-B983-03596CFA7F85}" type="datetimeFigureOut">
               <a:rPr lang="en-US" smtClean="0"/>
-              <a:t>6/2/2017</a:t>
+              <a:t>6/3/2017</a:t>
             </a:fld>
             <a:endParaRPr lang="en-US"/>
           </a:p>
@@ -3944,7 +3944,7 @@
           <a:p>
             <a:fld id="{D8098D11-86FE-477F-B983-03596CFA7F85}" type="datetimeFigureOut">
               <a:rPr lang="en-US" smtClean="0"/>
-              <a:t>6/2/2017</a:t>
+              <a:t>6/3/2017</a:t>
             </a:fld>
             <a:endParaRPr lang="en-US"/>
           </a:p>
@@ -4039,7 +4039,7 @@
           <a:p>
             <a:fld id="{D8098D11-86FE-477F-B983-03596CFA7F85}" type="datetimeFigureOut">
               <a:rPr lang="en-US" smtClean="0"/>
-              <a:t>6/2/2017</a:t>
+              <a:t>6/3/2017</a:t>
             </a:fld>
             <a:endParaRPr lang="en-US"/>
           </a:p>
@@ -4294,7 +4294,7 @@
           <a:p>
             <a:fld id="{D8098D11-86FE-477F-B983-03596CFA7F85}" type="datetimeFigureOut">
               <a:rPr lang="en-US" smtClean="0"/>
-              <a:t>6/2/2017</a:t>
+              <a:t>6/3/2017</a:t>
             </a:fld>
             <a:endParaRPr lang="en-US"/>
           </a:p>
@@ -4557,7 +4557,7 @@
           <a:p>
             <a:fld id="{D8098D11-86FE-477F-B983-03596CFA7F85}" type="datetimeFigureOut">
               <a:rPr lang="en-US" smtClean="0"/>
-              <a:t>6/2/2017</a:t>
+              <a:t>6/3/2017</a:t>
             </a:fld>
             <a:endParaRPr lang="en-US"/>
           </a:p>
@@ -5302,7 +5302,7 @@
           <a:p>
             <a:fld id="{D8098D11-86FE-477F-B983-03596CFA7F85}" type="datetimeFigureOut">
               <a:rPr lang="en-US" smtClean="0"/>
-              <a:t>6/2/2017</a:t>
+              <a:t>6/3/2017</a:t>
             </a:fld>
             <a:endParaRPr lang="en-US"/>
           </a:p>
@@ -6319,6 +6319,346 @@
   <p:clrMapOvr>
     <a:masterClrMapping/>
   </p:clrMapOvr>
+  <p:timing>
+    <p:tnLst>
+      <p:par>
+        <p:cTn id="1" dur="indefinite" restart="never" nodeType="tmRoot">
+          <p:childTnLst>
+            <p:seq concurrent="1" nextAc="seek">
+              <p:cTn id="2" dur="indefinite" nodeType="mainSeq">
+                <p:childTnLst>
+                  <p:par>
+                    <p:cTn id="3" fill="hold">
+                      <p:stCondLst>
+                        <p:cond delay="indefinite"/>
+                      </p:stCondLst>
+                      <p:childTnLst>
+                        <p:par>
+                          <p:cTn id="4" fill="hold">
+                            <p:stCondLst>
+                              <p:cond delay="0"/>
+                            </p:stCondLst>
+                            <p:childTnLst>
+                              <p:par>
+                                <p:cTn id="5" presetID="2" presetClass="entr" presetSubtype="4" fill="hold" nodeType="clickEffect">
+                                  <p:stCondLst>
+                                    <p:cond delay="0"/>
+                                  </p:stCondLst>
+                                  <p:childTnLst>
+                                    <p:set>
+                                      <p:cBhvr>
+                                        <p:cTn id="6" dur="1" fill="hold">
+                                          <p:stCondLst>
+                                            <p:cond delay="0"/>
+                                          </p:stCondLst>
+                                        </p:cTn>
+                                        <p:tgtEl>
+                                          <p:spTgt spid="13"/>
+                                        </p:tgtEl>
+                                        <p:attrNameLst>
+                                          <p:attrName>style.visibility</p:attrName>
+                                        </p:attrNameLst>
+                                      </p:cBhvr>
+                                      <p:to>
+                                        <p:strVal val="visible"/>
+                                      </p:to>
+                                    </p:set>
+                                    <p:anim calcmode="lin" valueType="num">
+                                      <p:cBhvr additive="base">
+                                        <p:cTn id="7" dur="500" fill="hold"/>
+                                        <p:tgtEl>
+                                          <p:spTgt spid="13"/>
+                                        </p:tgtEl>
+                                        <p:attrNameLst>
+                                          <p:attrName>ppt_x</p:attrName>
+                                        </p:attrNameLst>
+                                      </p:cBhvr>
+                                      <p:tavLst>
+                                        <p:tav tm="0">
+                                          <p:val>
+                                            <p:strVal val="#ppt_x"/>
+                                          </p:val>
+                                        </p:tav>
+                                        <p:tav tm="100000">
+                                          <p:val>
+                                            <p:strVal val="#ppt_x"/>
+                                          </p:val>
+                                        </p:tav>
+                                      </p:tavLst>
+                                    </p:anim>
+                                    <p:anim calcmode="lin" valueType="num">
+                                      <p:cBhvr additive="base">
+                                        <p:cTn id="8" dur="500" fill="hold"/>
+                                        <p:tgtEl>
+                                          <p:spTgt spid="13"/>
+                                        </p:tgtEl>
+                                        <p:attrNameLst>
+                                          <p:attrName>ppt_y</p:attrName>
+                                        </p:attrNameLst>
+                                      </p:cBhvr>
+                                      <p:tavLst>
+                                        <p:tav tm="0">
+                                          <p:val>
+                                            <p:strVal val="1+#ppt_h/2"/>
+                                          </p:val>
+                                        </p:tav>
+                                        <p:tav tm="100000">
+                                          <p:val>
+                                            <p:strVal val="#ppt_y"/>
+                                          </p:val>
+                                        </p:tav>
+                                      </p:tavLst>
+                                    </p:anim>
+                                  </p:childTnLst>
+                                </p:cTn>
+                              </p:par>
+                              <p:par>
+                                <p:cTn id="9" presetID="2" presetClass="entr" presetSubtype="4" fill="hold" nodeType="withEffect">
+                                  <p:stCondLst>
+                                    <p:cond delay="0"/>
+                                  </p:stCondLst>
+                                  <p:childTnLst>
+                                    <p:set>
+                                      <p:cBhvr>
+                                        <p:cTn id="10" dur="1" fill="hold">
+                                          <p:stCondLst>
+                                            <p:cond delay="0"/>
+                                          </p:stCondLst>
+                                        </p:cTn>
+                                        <p:tgtEl>
+                                          <p:spTgt spid="17"/>
+                                        </p:tgtEl>
+                                        <p:attrNameLst>
+                                          <p:attrName>style.visibility</p:attrName>
+                                        </p:attrNameLst>
+                                      </p:cBhvr>
+                                      <p:to>
+                                        <p:strVal val="visible"/>
+                                      </p:to>
+                                    </p:set>
+                                    <p:anim calcmode="lin" valueType="num">
+                                      <p:cBhvr additive="base">
+                                        <p:cTn id="11" dur="500" fill="hold"/>
+                                        <p:tgtEl>
+                                          <p:spTgt spid="17"/>
+                                        </p:tgtEl>
+                                        <p:attrNameLst>
+                                          <p:attrName>ppt_x</p:attrName>
+                                        </p:attrNameLst>
+                                      </p:cBhvr>
+                                      <p:tavLst>
+                                        <p:tav tm="0">
+                                          <p:val>
+                                            <p:strVal val="#ppt_x"/>
+                                          </p:val>
+                                        </p:tav>
+                                        <p:tav tm="100000">
+                                          <p:val>
+                                            <p:strVal val="#ppt_x"/>
+                                          </p:val>
+                                        </p:tav>
+                                      </p:tavLst>
+                                    </p:anim>
+                                    <p:anim calcmode="lin" valueType="num">
+                                      <p:cBhvr additive="base">
+                                        <p:cTn id="12" dur="500" fill="hold"/>
+                                        <p:tgtEl>
+                                          <p:spTgt spid="17"/>
+                                        </p:tgtEl>
+                                        <p:attrNameLst>
+                                          <p:attrName>ppt_y</p:attrName>
+                                        </p:attrNameLst>
+                                      </p:cBhvr>
+                                      <p:tavLst>
+                                        <p:tav tm="0">
+                                          <p:val>
+                                            <p:strVal val="1+#ppt_h/2"/>
+                                          </p:val>
+                                        </p:tav>
+                                        <p:tav tm="100000">
+                                          <p:val>
+                                            <p:strVal val="#ppt_y"/>
+                                          </p:val>
+                                        </p:tav>
+                                      </p:tavLst>
+                                    </p:anim>
+                                  </p:childTnLst>
+                                </p:cTn>
+                              </p:par>
+                              <p:par>
+                                <p:cTn id="13" presetID="2" presetClass="entr" presetSubtype="4" fill="hold" nodeType="withEffect">
+                                  <p:stCondLst>
+                                    <p:cond delay="0"/>
+                                  </p:stCondLst>
+                                  <p:childTnLst>
+                                    <p:set>
+                                      <p:cBhvr>
+                                        <p:cTn id="14" dur="1" fill="hold">
+                                          <p:stCondLst>
+                                            <p:cond delay="0"/>
+                                          </p:stCondLst>
+                                        </p:cTn>
+                                        <p:tgtEl>
+                                          <p:spTgt spid="19"/>
+                                        </p:tgtEl>
+                                        <p:attrNameLst>
+                                          <p:attrName>style.visibility</p:attrName>
+                                        </p:attrNameLst>
+                                      </p:cBhvr>
+                                      <p:to>
+                                        <p:strVal val="visible"/>
+                                      </p:to>
+                                    </p:set>
+                                    <p:anim calcmode="lin" valueType="num">
+                                      <p:cBhvr additive="base">
+                                        <p:cTn id="15" dur="500" fill="hold"/>
+                                        <p:tgtEl>
+                                          <p:spTgt spid="19"/>
+                                        </p:tgtEl>
+                                        <p:attrNameLst>
+                                          <p:attrName>ppt_x</p:attrName>
+                                        </p:attrNameLst>
+                                      </p:cBhvr>
+                                      <p:tavLst>
+                                        <p:tav tm="0">
+                                          <p:val>
+                                            <p:strVal val="#ppt_x"/>
+                                          </p:val>
+                                        </p:tav>
+                                        <p:tav tm="100000">
+                                          <p:val>
+                                            <p:strVal val="#ppt_x"/>
+                                          </p:val>
+                                        </p:tav>
+                                      </p:tavLst>
+                                    </p:anim>
+                                    <p:anim calcmode="lin" valueType="num">
+                                      <p:cBhvr additive="base">
+                                        <p:cTn id="16" dur="500" fill="hold"/>
+                                        <p:tgtEl>
+                                          <p:spTgt spid="19"/>
+                                        </p:tgtEl>
+                                        <p:attrNameLst>
+                                          <p:attrName>ppt_y</p:attrName>
+                                        </p:attrNameLst>
+                                      </p:cBhvr>
+                                      <p:tavLst>
+                                        <p:tav tm="0">
+                                          <p:val>
+                                            <p:strVal val="1+#ppt_h/2"/>
+                                          </p:val>
+                                        </p:tav>
+                                        <p:tav tm="100000">
+                                          <p:val>
+                                            <p:strVal val="#ppt_y"/>
+                                          </p:val>
+                                        </p:tav>
+                                      </p:tavLst>
+                                    </p:anim>
+                                  </p:childTnLst>
+                                </p:cTn>
+                              </p:par>
+                              <p:par>
+                                <p:cTn id="17" presetID="2" presetClass="entr" presetSubtype="4" fill="hold" nodeType="withEffect">
+                                  <p:stCondLst>
+                                    <p:cond delay="0"/>
+                                  </p:stCondLst>
+                                  <p:childTnLst>
+                                    <p:set>
+                                      <p:cBhvr>
+                                        <p:cTn id="18" dur="1" fill="hold">
+                                          <p:stCondLst>
+                                            <p:cond delay="0"/>
+                                          </p:stCondLst>
+                                        </p:cTn>
+                                        <p:tgtEl>
+                                          <p:spTgt spid="15"/>
+                                        </p:tgtEl>
+                                        <p:attrNameLst>
+                                          <p:attrName>style.visibility</p:attrName>
+                                        </p:attrNameLst>
+                                      </p:cBhvr>
+                                      <p:to>
+                                        <p:strVal val="visible"/>
+                                      </p:to>
+                                    </p:set>
+                                    <p:anim calcmode="lin" valueType="num">
+                                      <p:cBhvr additive="base">
+                                        <p:cTn id="19" dur="500" fill="hold"/>
+                                        <p:tgtEl>
+                                          <p:spTgt spid="15"/>
+                                        </p:tgtEl>
+                                        <p:attrNameLst>
+                                          <p:attrName>ppt_x</p:attrName>
+                                        </p:attrNameLst>
+                                      </p:cBhvr>
+                                      <p:tavLst>
+                                        <p:tav tm="0">
+                                          <p:val>
+                                            <p:strVal val="#ppt_x"/>
+                                          </p:val>
+                                        </p:tav>
+                                        <p:tav tm="100000">
+                                          <p:val>
+                                            <p:strVal val="#ppt_x"/>
+                                          </p:val>
+                                        </p:tav>
+                                      </p:tavLst>
+                                    </p:anim>
+                                    <p:anim calcmode="lin" valueType="num">
+                                      <p:cBhvr additive="base">
+                                        <p:cTn id="20" dur="500" fill="hold"/>
+                                        <p:tgtEl>
+                                          <p:spTgt spid="15"/>
+                                        </p:tgtEl>
+                                        <p:attrNameLst>
+                                          <p:attrName>ppt_y</p:attrName>
+                                        </p:attrNameLst>
+                                      </p:cBhvr>
+                                      <p:tavLst>
+                                        <p:tav tm="0">
+                                          <p:val>
+                                            <p:strVal val="1+#ppt_h/2"/>
+                                          </p:val>
+                                        </p:tav>
+                                        <p:tav tm="100000">
+                                          <p:val>
+                                            <p:strVal val="#ppt_y"/>
+                                          </p:val>
+                                        </p:tav>
+                                      </p:tavLst>
+                                    </p:anim>
+                                  </p:childTnLst>
+                                </p:cTn>
+                              </p:par>
+                            </p:childTnLst>
+                          </p:cTn>
+                        </p:par>
+                      </p:childTnLst>
+                    </p:cTn>
+                  </p:par>
+                </p:childTnLst>
+              </p:cTn>
+              <p:prevCondLst>
+                <p:cond evt="onPrev" delay="0">
+                  <p:tgtEl>
+                    <p:sldTgt/>
+                  </p:tgtEl>
+                </p:cond>
+              </p:prevCondLst>
+              <p:nextCondLst>
+                <p:cond evt="onNext" delay="0">
+                  <p:tgtEl>
+                    <p:sldTgt/>
+                  </p:tgtEl>
+                </p:cond>
+              </p:nextCondLst>
+            </p:seq>
+          </p:childTnLst>
+        </p:cTn>
+      </p:par>
+    </p:tnLst>
+  </p:timing>
 </p:sld>
 </file>
 
@@ -6456,6 +6796,212 @@
   <p:clrMapOvr>
     <a:masterClrMapping/>
   </p:clrMapOvr>
+  <p:timing>
+    <p:tnLst>
+      <p:par>
+        <p:cTn id="1" dur="indefinite" restart="never" nodeType="tmRoot">
+          <p:childTnLst>
+            <p:seq concurrent="1" nextAc="seek">
+              <p:cTn id="2" dur="indefinite" nodeType="mainSeq">
+                <p:childTnLst>
+                  <p:par>
+                    <p:cTn id="3" fill="hold">
+                      <p:stCondLst>
+                        <p:cond delay="indefinite"/>
+                      </p:stCondLst>
+                      <p:childTnLst>
+                        <p:par>
+                          <p:cTn id="4" fill="hold">
+                            <p:stCondLst>
+                              <p:cond delay="0"/>
+                            </p:stCondLst>
+                            <p:childTnLst>
+                              <p:par>
+                                <p:cTn id="5" presetID="2" presetClass="entr" presetSubtype="4" fill="hold" nodeType="clickEffect">
+                                  <p:stCondLst>
+                                    <p:cond delay="0"/>
+                                  </p:stCondLst>
+                                  <p:childTnLst>
+                                    <p:set>
+                                      <p:cBhvr>
+                                        <p:cTn id="6" dur="1" fill="hold">
+                                          <p:stCondLst>
+                                            <p:cond delay="0"/>
+                                          </p:stCondLst>
+                                        </p:cTn>
+                                        <p:tgtEl>
+                                          <p:spTgt spid="7"/>
+                                        </p:tgtEl>
+                                        <p:attrNameLst>
+                                          <p:attrName>style.visibility</p:attrName>
+                                        </p:attrNameLst>
+                                      </p:cBhvr>
+                                      <p:to>
+                                        <p:strVal val="visible"/>
+                                      </p:to>
+                                    </p:set>
+                                    <p:anim calcmode="lin" valueType="num">
+                                      <p:cBhvr additive="base">
+                                        <p:cTn id="7" dur="500" fill="hold"/>
+                                        <p:tgtEl>
+                                          <p:spTgt spid="7"/>
+                                        </p:tgtEl>
+                                        <p:attrNameLst>
+                                          <p:attrName>ppt_x</p:attrName>
+                                        </p:attrNameLst>
+                                      </p:cBhvr>
+                                      <p:tavLst>
+                                        <p:tav tm="0">
+                                          <p:val>
+                                            <p:strVal val="#ppt_x"/>
+                                          </p:val>
+                                        </p:tav>
+                                        <p:tav tm="100000">
+                                          <p:val>
+                                            <p:strVal val="#ppt_x"/>
+                                          </p:val>
+                                        </p:tav>
+                                      </p:tavLst>
+                                    </p:anim>
+                                    <p:anim calcmode="lin" valueType="num">
+                                      <p:cBhvr additive="base">
+                                        <p:cTn id="8" dur="500" fill="hold"/>
+                                        <p:tgtEl>
+                                          <p:spTgt spid="7"/>
+                                        </p:tgtEl>
+                                        <p:attrNameLst>
+                                          <p:attrName>ppt_y</p:attrName>
+                                        </p:attrNameLst>
+                                      </p:cBhvr>
+                                      <p:tavLst>
+                                        <p:tav tm="0">
+                                          <p:val>
+                                            <p:strVal val="1+#ppt_h/2"/>
+                                          </p:val>
+                                        </p:tav>
+                                        <p:tav tm="100000">
+                                          <p:val>
+                                            <p:strVal val="#ppt_y"/>
+                                          </p:val>
+                                        </p:tav>
+                                      </p:tavLst>
+                                    </p:anim>
+                                  </p:childTnLst>
+                                </p:cTn>
+                              </p:par>
+                              <p:par>
+                                <p:cTn id="9" presetID="2" presetClass="entr" presetSubtype="4" fill="hold" nodeType="withEffect">
+                                  <p:stCondLst>
+                                    <p:cond delay="0"/>
+                                  </p:stCondLst>
+                                  <p:childTnLst>
+                                    <p:set>
+                                      <p:cBhvr>
+                                        <p:cTn id="10" dur="1" fill="hold">
+                                          <p:stCondLst>
+                                            <p:cond delay="0"/>
+                                          </p:stCondLst>
+                                        </p:cTn>
+                                        <p:tgtEl>
+                                          <p:spTgt spid="5">
+                                            <p:txEl>
+                                              <p:pRg st="8" end="8"/>
+                                            </p:txEl>
+                                          </p:spTgt>
+                                        </p:tgtEl>
+                                        <p:attrNameLst>
+                                          <p:attrName>style.visibility</p:attrName>
+                                        </p:attrNameLst>
+                                      </p:cBhvr>
+                                      <p:to>
+                                        <p:strVal val="visible"/>
+                                      </p:to>
+                                    </p:set>
+                                    <p:anim calcmode="lin" valueType="num">
+                                      <p:cBhvr additive="base">
+                                        <p:cTn id="11" dur="500" fill="hold"/>
+                                        <p:tgtEl>
+                                          <p:spTgt spid="5">
+                                            <p:txEl>
+                                              <p:pRg st="8" end="8"/>
+                                            </p:txEl>
+                                          </p:spTgt>
+                                        </p:tgtEl>
+                                        <p:attrNameLst>
+                                          <p:attrName>ppt_x</p:attrName>
+                                        </p:attrNameLst>
+                                      </p:cBhvr>
+                                      <p:tavLst>
+                                        <p:tav tm="0">
+                                          <p:val>
+                                            <p:strVal val="#ppt_x"/>
+                                          </p:val>
+                                        </p:tav>
+                                        <p:tav tm="100000">
+                                          <p:val>
+                                            <p:strVal val="#ppt_x"/>
+                                          </p:val>
+                                        </p:tav>
+                                      </p:tavLst>
+                                    </p:anim>
+                                    <p:anim calcmode="lin" valueType="num">
+                                      <p:cBhvr additive="base">
+                                        <p:cTn id="12" dur="500" fill="hold"/>
+                                        <p:tgtEl>
+                                          <p:spTgt spid="5">
+                                            <p:txEl>
+                                              <p:pRg st="8" end="8"/>
+                                            </p:txEl>
+                                          </p:spTgt>
+                                        </p:tgtEl>
+                                        <p:attrNameLst>
+                                          <p:attrName>ppt_y</p:attrName>
+                                        </p:attrNameLst>
+                                      </p:cBhvr>
+                                      <p:tavLst>
+                                        <p:tav tm="0">
+                                          <p:val>
+                                            <p:strVal val="1+#ppt_h/2"/>
+                                          </p:val>
+                                        </p:tav>
+                                        <p:tav tm="100000">
+                                          <p:val>
+                                            <p:strVal val="#ppt_y"/>
+                                          </p:val>
+                                        </p:tav>
+                                      </p:tavLst>
+                                    </p:anim>
+                                  </p:childTnLst>
+                                </p:cTn>
+                              </p:par>
+                            </p:childTnLst>
+                          </p:cTn>
+                        </p:par>
+                      </p:childTnLst>
+                    </p:cTn>
+                  </p:par>
+                </p:childTnLst>
+              </p:cTn>
+              <p:prevCondLst>
+                <p:cond evt="onPrev" delay="0">
+                  <p:tgtEl>
+                    <p:sldTgt/>
+                  </p:tgtEl>
+                </p:cond>
+              </p:prevCondLst>
+              <p:nextCondLst>
+                <p:cond evt="onNext" delay="0">
+                  <p:tgtEl>
+                    <p:sldTgt/>
+                  </p:tgtEl>
+                </p:cond>
+              </p:nextCondLst>
+            </p:seq>
+          </p:childTnLst>
+        </p:cTn>
+      </p:par>
+    </p:tnLst>
+  </p:timing>
 </p:sld>
 </file>
 

</xml_diff>